<commit_message>
je mets la présentation pour Rafrite
</commit_message>
<xml_diff>
--- a/GeometryDashProjectNDSpresentation.pptx
+++ b/GeometryDashProjectNDSpresentation.pptx
@@ -5,16 +5,17 @@
     <p:sldMasterId id="2147483650" r:id="rId1"/>
   </p:sldMasterIdLst>
   <p:notesMasterIdLst>
-    <p:notesMasterId r:id="rId6"/>
+    <p:notesMasterId r:id="rId7"/>
   </p:notesMasterIdLst>
   <p:handoutMasterIdLst>
-    <p:handoutMasterId r:id="rId7"/>
+    <p:handoutMasterId r:id="rId8"/>
   </p:handoutMasterIdLst>
   <p:sldIdLst>
     <p:sldId id="390" r:id="rId2"/>
     <p:sldId id="939" r:id="rId3"/>
     <p:sldId id="940" r:id="rId4"/>
-    <p:sldId id="941" r:id="rId5"/>
+    <p:sldId id="942" r:id="rId5"/>
+    <p:sldId id="941" r:id="rId6"/>
   </p:sldIdLst>
   <p:sldSz cx="9144000" cy="6858000" type="screen4x3"/>
   <p:notesSz cx="7099300" cy="10234613"/>
@@ -176,6 +177,14 @@
 </p:presentation>
 </file>
 
+<file path=ppt/revisionInfo.xml><?xml version="1.0" encoding="utf-8"?>
+<p1510:revInfo xmlns:a="http://schemas.openxmlformats.org/drawingml/2006/main" xmlns:r="http://schemas.openxmlformats.org/officeDocument/2006/relationships" xmlns:p1510="http://schemas.microsoft.com/office/powerpoint/2015/10/main">
+  <p1510:revLst>
+    <p1510:client id="{3FF88C40-9914-475F-8F9C-B7ED55521F21}" v="922" dt="2023-01-23T10:10:03.235"/>
+  </p1510:revLst>
+</p1510:revInfo>
+</file>
+
 <file path=ppt/changesInfos/changesInfo1.xml><?xml version="1.0" encoding="utf-8"?>
 <pc:chgInfo xmlns:a="http://schemas.openxmlformats.org/drawingml/2006/main" xmlns:r="http://schemas.openxmlformats.org/officeDocument/2006/relationships" xmlns:ac="http://schemas.microsoft.com/office/drawing/2013/main/command" xmlns:pc="http://schemas.microsoft.com/office/powerpoint/2013/main/command">
   <pc:docChgLst>
@@ -199,6 +208,114 @@
             <ac:spMk id="10" creationId="{00000000-0000-0000-0000-000000000000}"/>
           </ac:spMkLst>
         </pc:spChg>
+      </pc:sldChg>
+    </pc:docChg>
+  </pc:docChgLst>
+  <pc:docChgLst>
+    <pc:chgData name="Yass la menace" userId="677f79b77126fda3" providerId="LiveId" clId="{3FF88C40-9914-475F-8F9C-B7ED55521F21}"/>
+    <pc:docChg chg="custSel addSld delSld modSld">
+      <pc:chgData name="Yass la menace" userId="677f79b77126fda3" providerId="LiveId" clId="{3FF88C40-9914-475F-8F9C-B7ED55521F21}" dt="2023-01-23T10:14:44.069" v="1300" actId="313"/>
+      <pc:docMkLst>
+        <pc:docMk/>
+      </pc:docMkLst>
+      <pc:sldChg chg="modSp mod modAnim">
+        <pc:chgData name="Yass la menace" userId="677f79b77126fda3" providerId="LiveId" clId="{3FF88C40-9914-475F-8F9C-B7ED55521F21}" dt="2023-01-22T14:59:15.189" v="921" actId="20577"/>
+        <pc:sldMkLst>
+          <pc:docMk/>
+          <pc:sldMk cId="0" sldId="939"/>
+        </pc:sldMkLst>
+        <pc:spChg chg="mod">
+          <ac:chgData name="Yass la menace" userId="677f79b77126fda3" providerId="LiveId" clId="{3FF88C40-9914-475F-8F9C-B7ED55521F21}" dt="2023-01-22T14:59:15.189" v="921" actId="20577"/>
+          <ac:spMkLst>
+            <pc:docMk/>
+            <pc:sldMk cId="0" sldId="939"/>
+            <ac:spMk id="10" creationId="{00000000-0000-0000-0000-000000000000}"/>
+          </ac:spMkLst>
+        </pc:spChg>
+      </pc:sldChg>
+      <pc:sldChg chg="modSp modAnim">
+        <pc:chgData name="Yass la menace" userId="677f79b77126fda3" providerId="LiveId" clId="{3FF88C40-9914-475F-8F9C-B7ED55521F21}" dt="2023-01-22T12:00:27.387" v="811" actId="20577"/>
+        <pc:sldMkLst>
+          <pc:docMk/>
+          <pc:sldMk cId="0" sldId="940"/>
+        </pc:sldMkLst>
+        <pc:spChg chg="mod">
+          <ac:chgData name="Yass la menace" userId="677f79b77126fda3" providerId="LiveId" clId="{3FF88C40-9914-475F-8F9C-B7ED55521F21}" dt="2023-01-22T12:00:27.387" v="811" actId="20577"/>
+          <ac:spMkLst>
+            <pc:docMk/>
+            <pc:sldMk cId="0" sldId="940"/>
+            <ac:spMk id="10" creationId="{00000000-0000-0000-0000-000000000000}"/>
+          </ac:spMkLst>
+        </pc:spChg>
+      </pc:sldChg>
+      <pc:sldChg chg="addSp modSp mod">
+        <pc:chgData name="Yass la menace" userId="677f79b77126fda3" providerId="LiveId" clId="{3FF88C40-9914-475F-8F9C-B7ED55521F21}" dt="2023-01-23T10:11:18.671" v="1020" actId="1076"/>
+        <pc:sldMkLst>
+          <pc:docMk/>
+          <pc:sldMk cId="0" sldId="941"/>
+        </pc:sldMkLst>
+        <pc:spChg chg="mod">
+          <ac:chgData name="Yass la menace" userId="677f79b77126fda3" providerId="LiveId" clId="{3FF88C40-9914-475F-8F9C-B7ED55521F21}" dt="2023-01-23T10:11:08.732" v="1017" actId="5793"/>
+          <ac:spMkLst>
+            <pc:docMk/>
+            <pc:sldMk cId="0" sldId="941"/>
+            <ac:spMk id="10" creationId="{00000000-0000-0000-0000-000000000000}"/>
+          </ac:spMkLst>
+        </pc:spChg>
+        <pc:picChg chg="add mod">
+          <ac:chgData name="Yass la menace" userId="677f79b77126fda3" providerId="LiveId" clId="{3FF88C40-9914-475F-8F9C-B7ED55521F21}" dt="2023-01-23T10:11:16.978" v="1019" actId="1076"/>
+          <ac:picMkLst>
+            <pc:docMk/>
+            <pc:sldMk cId="0" sldId="941"/>
+            <ac:picMk id="3" creationId="{08D4E7EE-F634-CC88-49C7-79F0271A3F05}"/>
+          </ac:picMkLst>
+        </pc:picChg>
+        <pc:picChg chg="add mod">
+          <ac:chgData name="Yass la menace" userId="677f79b77126fda3" providerId="LiveId" clId="{3FF88C40-9914-475F-8F9C-B7ED55521F21}" dt="2023-01-23T10:11:18.671" v="1020" actId="1076"/>
+          <ac:picMkLst>
+            <pc:docMk/>
+            <pc:sldMk cId="0" sldId="941"/>
+            <ac:picMk id="5" creationId="{33173F2A-2803-AB17-90D2-169B1C691537}"/>
+          </ac:picMkLst>
+        </pc:picChg>
+      </pc:sldChg>
+      <pc:sldChg chg="delSp modSp new mod">
+        <pc:chgData name="Yass la menace" userId="677f79b77126fda3" providerId="LiveId" clId="{3FF88C40-9914-475F-8F9C-B7ED55521F21}" dt="2023-01-23T10:14:44.069" v="1300" actId="313"/>
+        <pc:sldMkLst>
+          <pc:docMk/>
+          <pc:sldMk cId="1412340150" sldId="942"/>
+        </pc:sldMkLst>
+        <pc:spChg chg="mod">
+          <ac:chgData name="Yass la menace" userId="677f79b77126fda3" providerId="LiveId" clId="{3FF88C40-9914-475F-8F9C-B7ED55521F21}" dt="2023-01-23T10:12:10.659" v="1036" actId="113"/>
+          <ac:spMkLst>
+            <pc:docMk/>
+            <pc:sldMk cId="1412340150" sldId="942"/>
+            <ac:spMk id="2" creationId="{3FC15644-E6D0-ED04-C2BE-A2DE878524BB}"/>
+          </ac:spMkLst>
+        </pc:spChg>
+        <pc:spChg chg="mod">
+          <ac:chgData name="Yass la menace" userId="677f79b77126fda3" providerId="LiveId" clId="{3FF88C40-9914-475F-8F9C-B7ED55521F21}" dt="2023-01-23T10:14:44.069" v="1300" actId="313"/>
+          <ac:spMkLst>
+            <pc:docMk/>
+            <pc:sldMk cId="1412340150" sldId="942"/>
+            <ac:spMk id="3" creationId="{B93A1AB0-4F4E-7183-34D6-91B3FEB44D16}"/>
+          </ac:spMkLst>
+        </pc:spChg>
+        <pc:spChg chg="del">
+          <ac:chgData name="Yass la menace" userId="677f79b77126fda3" providerId="LiveId" clId="{3FF88C40-9914-475F-8F9C-B7ED55521F21}" dt="2023-01-23T10:12:16.703" v="1037" actId="478"/>
+          <ac:spMkLst>
+            <pc:docMk/>
+            <pc:sldMk cId="1412340150" sldId="942"/>
+            <ac:spMk id="4" creationId="{A2DD11BA-B697-19EF-BE98-514864ABD9D5}"/>
+          </ac:spMkLst>
+        </pc:spChg>
+      </pc:sldChg>
+      <pc:sldChg chg="add del">
+        <pc:chgData name="Yass la menace" userId="677f79b77126fda3" providerId="LiveId" clId="{3FF88C40-9914-475F-8F9C-B7ED55521F21}" dt="2023-01-23T10:11:55.677" v="1022" actId="47"/>
+        <pc:sldMkLst>
+          <pc:docMk/>
+          <pc:sldMk cId="1722629337" sldId="942"/>
+        </pc:sldMkLst>
       </pc:sldChg>
     </pc:docChg>
   </pc:docChgLst>
@@ -1268,7 +1385,7 @@
               <a:pPr>
                 <a:defRPr/>
               </a:pPr>
-              <a:t>4</a:t>
+              <a:t>5</a:t>
             </a:fld>
             <a:endParaRPr lang="en-US"/>
           </a:p>
@@ -5711,8 +5828,8 @@
           <a:p>
             <a:pPr lvl="1"/>
             <a:r>
-              <a:rPr lang="en-US" sz="1800" dirty="0"/>
-              <a:t>describe what you use the ARM9 (and optionally the ARM7) for</a:t>
+              <a:rPr lang="en-CH" sz="1800" dirty="0"/>
+              <a:t>ARM9 controls the two screens, the buttons and sends IPC messages to the ARM7 to control the sound and the touchscreen</a:t>
             </a:r>
             <a:endParaRPr lang="en-US" dirty="0"/>
           </a:p>
@@ -5731,8 +5848,12 @@
           <a:p>
             <a:pPr lvl="1"/>
             <a:r>
-              <a:rPr lang="en-US" sz="1800" dirty="0"/>
-              <a:t>describe how you use the timers and interrupts in your project </a:t>
+              <a:rPr lang="fr-FR" sz="1800" dirty="0"/>
+              <a:t>U</a:t>
+            </a:r>
+            <a:r>
+              <a:rPr lang="en-CH" sz="1800" dirty="0"/>
+              <a:t>sed to make the sprite jump and blinking effect</a:t>
             </a:r>
             <a:endParaRPr lang="en-US" dirty="0"/>
           </a:p>
@@ -5751,12 +5872,27 @@
           <a:p>
             <a:pPr lvl="1"/>
             <a:r>
-              <a:rPr lang="en-US" sz="1800" dirty="0"/>
-              <a:t>describe how you use the main/sub screen in the project</a:t>
-            </a:r>
-          </a:p>
-          <a:p>
-            <a:pPr>
+              <a:rPr lang="en-CH" sz="1800" dirty="0"/>
+              <a:t>Main screen: Mode 0 with backgrounds 3 and 2 (Tiled Mode)</a:t>
+            </a:r>
+          </a:p>
+          <a:p>
+            <a:pPr lvl="1"/>
+            <a:r>
+              <a:rPr lang="fr-FR" sz="1800" dirty="0"/>
+              <a:t>S</a:t>
+            </a:r>
+            <a:r>
+              <a:rPr lang="en-CH" sz="1800" dirty="0" err="1"/>
+              <a:t>ub</a:t>
+            </a:r>
+            <a:r>
+              <a:rPr lang="en-CH" sz="1800" dirty="0"/>
+              <a:t> screen: Mode 0 with backgrounds 1 and 0 (Tiled Mode)</a:t>
+            </a:r>
+          </a:p>
+          <a:p>
+            <a:pPr marL="456913" lvl="1" indent="0">
               <a:buNone/>
             </a:pPr>
             <a:endParaRPr lang="en-US" sz="1600" dirty="0"/>
@@ -5770,12 +5906,35 @@
           <a:p>
             <a:pPr lvl="1"/>
             <a:r>
-              <a:rPr lang="en-US" sz="1800" dirty="0"/>
-              <a:t>describe how you use the keypad in the project</a:t>
-            </a:r>
-          </a:p>
-          <a:p>
-            <a:endParaRPr lang="en-US" sz="2000" dirty="0"/>
+              <a:rPr lang="en-CH" sz="1800" dirty="0"/>
+              <a:t>Controlling the game:</a:t>
+            </a:r>
+          </a:p>
+          <a:p>
+            <a:pPr lvl="2"/>
+            <a:r>
+              <a:rPr lang="en-CH" dirty="0"/>
+              <a:t>KEY_UP= sprite jump</a:t>
+            </a:r>
+          </a:p>
+          <a:p>
+            <a:pPr lvl="2"/>
+            <a:r>
+              <a:rPr lang="en-CH" dirty="0"/>
+              <a:t>KEY_START=restart the game</a:t>
+            </a:r>
+          </a:p>
+          <a:p>
+            <a:pPr lvl="1"/>
+            <a:r>
+              <a:rPr lang="en-CH" dirty="0"/>
+              <a:t>Reading the keypad by polling</a:t>
+            </a:r>
+            <a:endParaRPr lang="en-US" dirty="0"/>
+          </a:p>
+          <a:p>
+            <a:pPr lvl="2"/>
+            <a:endParaRPr lang="en-US" dirty="0"/>
           </a:p>
           <a:p>
             <a:pPr>
@@ -6042,6 +6201,37 @@
                                   </p:childTnLst>
                                 </p:cTn>
                               </p:par>
+                              <p:par>
+                                <p:cTn id="21" presetID="1" presetClass="entr" presetSubtype="0" fill="hold" grpId="0" nodeType="withEffect">
+                                  <p:stCondLst>
+                                    <p:cond delay="0"/>
+                                  </p:stCondLst>
+                                  <p:childTnLst>
+                                    <p:set>
+                                      <p:cBhvr>
+                                        <p:cTn id="22" dur="1" fill="hold">
+                                          <p:stCondLst>
+                                            <p:cond delay="0"/>
+                                          </p:stCondLst>
+                                        </p:cTn>
+                                        <p:tgtEl>
+                                          <p:spTgt spid="10">
+                                            <p:txEl>
+                                              <p:pRg st="8" end="8"/>
+                                            </p:txEl>
+                                          </p:spTgt>
+                                        </p:tgtEl>
+                                        <p:attrNameLst>
+                                          <p:attrName>style.visibility</p:attrName>
+                                        </p:attrNameLst>
+                                      </p:cBhvr>
+                                      <p:to>
+                                        <p:strVal val="visible"/>
+                                      </p:to>
+                                    </p:set>
+                                  </p:childTnLst>
+                                </p:cTn>
+                              </p:par>
                             </p:childTnLst>
                           </p:cTn>
                         </p:par>
@@ -6049,26 +6239,26 @@
                     </p:cTn>
                   </p:par>
                   <p:par>
-                    <p:cTn id="21" fill="hold">
+                    <p:cTn id="23" fill="hold">
                       <p:stCondLst>
                         <p:cond delay="indefinite"/>
                       </p:stCondLst>
                       <p:childTnLst>
                         <p:par>
-                          <p:cTn id="22" fill="hold">
+                          <p:cTn id="24" fill="hold">
                             <p:stCondLst>
                               <p:cond delay="0"/>
                             </p:stCondLst>
                             <p:childTnLst>
                               <p:par>
-                                <p:cTn id="23" presetID="1" presetClass="entr" presetSubtype="0" fill="hold" grpId="0" nodeType="clickEffect">
+                                <p:cTn id="25" presetID="1" presetClass="entr" presetSubtype="0" fill="hold" grpId="0" nodeType="clickEffect">
                                   <p:stCondLst>
                                     <p:cond delay="0"/>
                                   </p:stCondLst>
                                   <p:childTnLst>
                                     <p:set>
                                       <p:cBhvr>
-                                        <p:cTn id="24" dur="1" fill="hold">
+                                        <p:cTn id="26" dur="1" fill="hold">
                                           <p:stCondLst>
                                             <p:cond delay="0"/>
                                           </p:stCondLst>
@@ -6076,7 +6266,7 @@
                                         <p:tgtEl>
                                           <p:spTgt spid="10">
                                             <p:txEl>
-                                              <p:pRg st="9" end="9"/>
+                                              <p:pRg st="10" end="10"/>
                                             </p:txEl>
                                           </p:spTgt>
                                         </p:tgtEl>
@@ -6092,14 +6282,14 @@
                                 </p:cTn>
                               </p:par>
                               <p:par>
-                                <p:cTn id="25" presetID="1" presetClass="entr" presetSubtype="0" fill="hold" grpId="0" nodeType="withEffect">
+                                <p:cTn id="27" presetID="1" presetClass="entr" presetSubtype="0" fill="hold" grpId="0" nodeType="withEffect">
                                   <p:stCondLst>
                                     <p:cond delay="0"/>
                                   </p:stCondLst>
                                   <p:childTnLst>
                                     <p:set>
                                       <p:cBhvr>
-                                        <p:cTn id="26" dur="1" fill="hold">
+                                        <p:cTn id="28" dur="1" fill="hold">
                                           <p:stCondLst>
                                             <p:cond delay="0"/>
                                           </p:stCondLst>
@@ -6107,7 +6297,100 @@
                                         <p:tgtEl>
                                           <p:spTgt spid="10">
                                             <p:txEl>
-                                              <p:pRg st="10" end="10"/>
+                                              <p:pRg st="11" end="11"/>
+                                            </p:txEl>
+                                          </p:spTgt>
+                                        </p:tgtEl>
+                                        <p:attrNameLst>
+                                          <p:attrName>style.visibility</p:attrName>
+                                        </p:attrNameLst>
+                                      </p:cBhvr>
+                                      <p:to>
+                                        <p:strVal val="visible"/>
+                                      </p:to>
+                                    </p:set>
+                                  </p:childTnLst>
+                                </p:cTn>
+                              </p:par>
+                              <p:par>
+                                <p:cTn id="29" presetID="1" presetClass="entr" presetSubtype="0" fill="hold" grpId="0" nodeType="withEffect">
+                                  <p:stCondLst>
+                                    <p:cond delay="0"/>
+                                  </p:stCondLst>
+                                  <p:childTnLst>
+                                    <p:set>
+                                      <p:cBhvr>
+                                        <p:cTn id="30" dur="1" fill="hold">
+                                          <p:stCondLst>
+                                            <p:cond delay="0"/>
+                                          </p:stCondLst>
+                                        </p:cTn>
+                                        <p:tgtEl>
+                                          <p:spTgt spid="10">
+                                            <p:txEl>
+                                              <p:pRg st="12" end="12"/>
+                                            </p:txEl>
+                                          </p:spTgt>
+                                        </p:tgtEl>
+                                        <p:attrNameLst>
+                                          <p:attrName>style.visibility</p:attrName>
+                                        </p:attrNameLst>
+                                      </p:cBhvr>
+                                      <p:to>
+                                        <p:strVal val="visible"/>
+                                      </p:to>
+                                    </p:set>
+                                  </p:childTnLst>
+                                </p:cTn>
+                              </p:par>
+                              <p:par>
+                                <p:cTn id="31" presetID="1" presetClass="entr" presetSubtype="0" fill="hold" grpId="0" nodeType="withEffect">
+                                  <p:stCondLst>
+                                    <p:cond delay="0"/>
+                                  </p:stCondLst>
+                                  <p:childTnLst>
+                                    <p:set>
+                                      <p:cBhvr>
+                                        <p:cTn id="32" dur="1" fill="hold">
+                                          <p:stCondLst>
+                                            <p:cond delay="0"/>
+                                          </p:stCondLst>
+                                        </p:cTn>
+                                        <p:tgtEl>
+                                          <p:spTgt spid="10">
+                                            <p:txEl>
+                                              <p:pRg st="13" end="13"/>
+                                            </p:txEl>
+                                          </p:spTgt>
+                                        </p:tgtEl>
+                                        <p:attrNameLst>
+                                          <p:attrName>style.visibility</p:attrName>
+                                        </p:attrNameLst>
+                                      </p:cBhvr>
+                                      <p:to>
+                                        <p:strVal val="visible"/>
+                                      </p:to>
+                                    </p:set>
+                                  </p:childTnLst>
+                                </p:cTn>
+                              </p:par>
+                              <p:par>
+                                <p:cTn id="33" presetID="1" presetClass="entr" presetSubtype="0" fill="hold" grpId="0" nodeType="withEffect">
+                                  <p:stCondLst>
+                                    <p:cond delay="0"/>
+                                  </p:stCondLst>
+                                  <p:childTnLst>
+                                    <p:set>
+                                      <p:cBhvr>
+                                        <p:cTn id="34" dur="1" fill="hold">
+                                          <p:stCondLst>
+                                            <p:cond delay="0"/>
+                                          </p:stCondLst>
+                                        </p:cTn>
+                                        <p:tgtEl>
+                                          <p:spTgt spid="10">
+                                            <p:txEl>
+                                              <p:pRg st="14" end="14"/>
                                             </p:txEl>
                                           </p:spTgt>
                                         </p:tgtEl>
@@ -6233,9 +6516,28 @@
           <a:p>
             <a:pPr lvl="1"/>
             <a:r>
-              <a:rPr lang="en-US" sz="1800" dirty="0"/>
-              <a:t>describe how you use the touchscreen features in the project</a:t>
-            </a:r>
+              <a:rPr lang="en-CH" sz="1800" dirty="0"/>
+              <a:t>Controlling the sprite’s action:</a:t>
+            </a:r>
+          </a:p>
+          <a:p>
+            <a:pPr lvl="2"/>
+            <a:r>
+              <a:rPr lang="fr-FR" sz="1600" dirty="0"/>
+              <a:t>T</a:t>
+            </a:r>
+            <a:r>
+              <a:rPr lang="en-CH" sz="1600" dirty="0"/>
+              <a:t>he sprite jumps when the touchscreen is touched</a:t>
+            </a:r>
+          </a:p>
+          <a:p>
+            <a:pPr lvl="1"/>
+            <a:r>
+              <a:rPr lang="en-CH" sz="1800" dirty="0"/>
+              <a:t>Reading touchscreen by polling</a:t>
+            </a:r>
+            <a:endParaRPr lang="en-US" sz="1800" dirty="0"/>
           </a:p>
           <a:p>
             <a:pPr marL="456913" lvl="1" indent="0">
@@ -6252,36 +6554,25 @@
           <a:p>
             <a:pPr lvl="1"/>
             <a:r>
-              <a:rPr lang="en-US" sz="1800" dirty="0"/>
-              <a:t>describe how you use the sound devices (speakers or input channels) in the project</a:t>
-            </a:r>
-          </a:p>
-          <a:p>
-            <a:pPr marL="456913" lvl="1" indent="0">
-              <a:buNone/>
-            </a:pPr>
-            <a:endParaRPr lang="en-US" sz="1600" dirty="0"/>
-          </a:p>
-          <a:p>
-            <a:r>
-              <a:rPr lang="en-US" sz="2000" b="1" dirty="0"/>
-              <a:t>Secondary Storage (optional)</a:t>
+              <a:rPr lang="fr-FR" sz="1800" dirty="0"/>
+              <a:t>P</a:t>
+            </a:r>
+            <a:r>
+              <a:rPr lang="en-CH" sz="1800" dirty="0"/>
+              <a:t>laying music module in a loop when starting the game</a:t>
             </a:r>
           </a:p>
           <a:p>
             <a:pPr lvl="1"/>
             <a:r>
-              <a:rPr lang="en-US" sz="1800" dirty="0"/>
-              <a:t>describe how you use the </a:t>
-            </a:r>
-            <a:r>
-              <a:rPr lang="en-US" sz="1800" dirty="0" err="1"/>
-              <a:t>SDcard</a:t>
-            </a:r>
-            <a:r>
-              <a:rPr lang="en-US" sz="1800" dirty="0"/>
-              <a:t> file system in the project</a:t>
-            </a:r>
+              <a:rPr lang="fr-FR" sz="1800" dirty="0"/>
+              <a:t>T</a:t>
+            </a:r>
+            <a:r>
+              <a:rPr lang="en-CH" sz="1800" dirty="0"/>
+              <a:t>wo sound effects are played when jumping or colliding with an obstacle</a:t>
+            </a:r>
+            <a:endParaRPr lang="en-US" sz="1800" dirty="0"/>
           </a:p>
           <a:p>
             <a:pPr marL="456913" lvl="1" indent="0">
@@ -6291,37 +6582,6 @@
           </a:p>
           <a:p>
             <a:r>
-              <a:rPr lang="en-US" sz="2000" b="1" dirty="0" err="1"/>
-              <a:t>WiFi</a:t>
-            </a:r>
-            <a:r>
-              <a:rPr lang="en-US" sz="2000" b="1" dirty="0"/>
-              <a:t> (optional)</a:t>
-            </a:r>
-          </a:p>
-          <a:p>
-            <a:pPr lvl="1"/>
-            <a:r>
-              <a:rPr lang="en-US" sz="1800" dirty="0"/>
-              <a:t>describe how you use the </a:t>
-            </a:r>
-            <a:r>
-              <a:rPr lang="en-US" sz="1800" dirty="0" err="1"/>
-              <a:t>WiFi</a:t>
-            </a:r>
-            <a:r>
-              <a:rPr lang="en-US" sz="1800" dirty="0"/>
-              <a:t> in the project</a:t>
-            </a:r>
-          </a:p>
-          <a:p>
-            <a:pPr marL="456913" lvl="1" indent="0">
-              <a:buNone/>
-            </a:pPr>
-            <a:endParaRPr lang="en-US" sz="1800" dirty="0"/>
-          </a:p>
-          <a:p>
-            <a:r>
               <a:rPr lang="en-US" sz="2000" b="1" dirty="0"/>
               <a:t>Sprites (optional)</a:t>
             </a:r>
@@ -6330,9 +6590,14 @@
           <a:p>
             <a:pPr lvl="1"/>
             <a:r>
-              <a:rPr lang="en-US" sz="1800" dirty="0"/>
-              <a:t>describe how you use the sprites in the project</a:t>
-            </a:r>
+              <a:rPr lang="fr-FR" sz="1800" dirty="0"/>
+              <a:t>T</a:t>
+            </a:r>
+            <a:r>
+              <a:rPr lang="en-CH" sz="1800" dirty="0"/>
+              <a:t>he sprite is the main character of the game and its goal is to walk through the virtual world without colliding with obstacles</a:t>
+            </a:r>
+            <a:endParaRPr lang="en-US" sz="1800" dirty="0"/>
           </a:p>
           <a:p>
             <a:endParaRPr lang="en-US" sz="2200" dirty="0"/>
@@ -6439,26 +6704,39 @@
                                   </p:childTnLst>
                                 </p:cTn>
                               </p:par>
-                            </p:childTnLst>
-                          </p:cTn>
-                        </p:par>
-                      </p:childTnLst>
-                    </p:cTn>
-                  </p:par>
-                  <p:par>
-                    <p:cTn id="9" fill="hold">
-                      <p:stCondLst>
-                        <p:cond delay="indefinite"/>
-                      </p:stCondLst>
-                      <p:childTnLst>
-                        <p:par>
-                          <p:cTn id="10" fill="hold">
-                            <p:stCondLst>
-                              <p:cond delay="0"/>
-                            </p:stCondLst>
-                            <p:childTnLst>
                               <p:par>
-                                <p:cTn id="11" presetID="1" presetClass="entr" presetSubtype="0" fill="hold" grpId="0" nodeType="clickEffect">
+                                <p:cTn id="9" presetID="1" presetClass="entr" presetSubtype="0" fill="hold" grpId="0" nodeType="withEffect">
+                                  <p:stCondLst>
+                                    <p:cond delay="0"/>
+                                  </p:stCondLst>
+                                  <p:childTnLst>
+                                    <p:set>
+                                      <p:cBhvr>
+                                        <p:cTn id="10" dur="1" fill="hold">
+                                          <p:stCondLst>
+                                            <p:cond delay="0"/>
+                                          </p:stCondLst>
+                                        </p:cTn>
+                                        <p:tgtEl>
+                                          <p:spTgt spid="10">
+                                            <p:txEl>
+                                              <p:pRg st="3" end="3"/>
+                                            </p:txEl>
+                                          </p:spTgt>
+                                        </p:tgtEl>
+                                        <p:attrNameLst>
+                                          <p:attrName>style.visibility</p:attrName>
+                                        </p:attrNameLst>
+                                      </p:cBhvr>
+                                      <p:to>
+                                        <p:strVal val="visible"/>
+                                      </p:to>
+                                    </p:set>
+                                  </p:childTnLst>
+                                </p:cTn>
+                              </p:par>
+                              <p:par>
+                                <p:cTn id="11" presetID="1" presetClass="entr" presetSubtype="0" fill="hold" grpId="0" nodeType="withEffect">
                                   <p:stCondLst>
                                     <p:cond delay="0"/>
                                   </p:stCondLst>
@@ -6488,15 +6766,33 @@
                                   </p:childTnLst>
                                 </p:cTn>
                               </p:par>
+                            </p:childTnLst>
+                          </p:cTn>
+                        </p:par>
+                      </p:childTnLst>
+                    </p:cTn>
+                  </p:par>
+                  <p:par>
+                    <p:cTn id="13" fill="hold">
+                      <p:stCondLst>
+                        <p:cond delay="indefinite"/>
+                      </p:stCondLst>
+                      <p:childTnLst>
+                        <p:par>
+                          <p:cTn id="14" fill="hold">
+                            <p:stCondLst>
+                              <p:cond delay="0"/>
+                            </p:stCondLst>
+                            <p:childTnLst>
                               <p:par>
-                                <p:cTn id="13" presetID="1" presetClass="entr" presetSubtype="0" fill="hold" grpId="0" nodeType="withEffect">
+                                <p:cTn id="15" presetID="1" presetClass="entr" presetSubtype="0" fill="hold" grpId="0" nodeType="clickEffect">
                                   <p:stCondLst>
                                     <p:cond delay="0"/>
                                   </p:stCondLst>
                                   <p:childTnLst>
                                     <p:set>
                                       <p:cBhvr>
-                                        <p:cTn id="14" dur="1" fill="hold">
+                                        <p:cTn id="16" dur="1" fill="hold">
                                           <p:stCondLst>
                                             <p:cond delay="0"/>
                                           </p:stCondLst>
@@ -6504,7 +6800,7 @@
                                         <p:tgtEl>
                                           <p:spTgt spid="10">
                                             <p:txEl>
-                                              <p:pRg st="5" end="5"/>
+                                              <p:pRg st="6" end="6"/>
                                             </p:txEl>
                                           </p:spTgt>
                                         </p:tgtEl>
@@ -6519,26 +6815,8 @@
                                   </p:childTnLst>
                                 </p:cTn>
                               </p:par>
-                            </p:childTnLst>
-                          </p:cTn>
-                        </p:par>
-                      </p:childTnLst>
-                    </p:cTn>
-                  </p:par>
-                  <p:par>
-                    <p:cTn id="15" fill="hold">
-                      <p:stCondLst>
-                        <p:cond delay="indefinite"/>
-                      </p:stCondLst>
-                      <p:childTnLst>
-                        <p:par>
-                          <p:cTn id="16" fill="hold">
-                            <p:stCondLst>
-                              <p:cond delay="0"/>
-                            </p:stCondLst>
-                            <p:childTnLst>
                               <p:par>
-                                <p:cTn id="17" presetID="1" presetClass="entr" presetSubtype="0" fill="hold" grpId="0" nodeType="clickEffect">
+                                <p:cTn id="17" presetID="1" presetClass="entr" presetSubtype="0" fill="hold" grpId="0" nodeType="withEffect">
                                   <p:stCondLst>
                                     <p:cond delay="0"/>
                                   </p:stCondLst>
@@ -6685,86 +6963,6 @@
                       </p:childTnLst>
                     </p:cTn>
                   </p:par>
-                  <p:par>
-                    <p:cTn id="27" fill="hold">
-                      <p:stCondLst>
-                        <p:cond delay="indefinite"/>
-                      </p:stCondLst>
-                      <p:childTnLst>
-                        <p:par>
-                          <p:cTn id="28" fill="hold">
-                            <p:stCondLst>
-                              <p:cond delay="0"/>
-                            </p:stCondLst>
-                            <p:childTnLst>
-                              <p:par>
-                                <p:cTn id="29" presetID="1" presetClass="entr" presetSubtype="0" fill="hold" grpId="0" nodeType="clickEffect">
-                                  <p:stCondLst>
-                                    <p:cond delay="0"/>
-                                  </p:stCondLst>
-                                  <p:childTnLst>
-                                    <p:set>
-                                      <p:cBhvr>
-                                        <p:cTn id="30" dur="1" fill="hold">
-                                          <p:stCondLst>
-                                            <p:cond delay="0"/>
-                                          </p:stCondLst>
-                                        </p:cTn>
-                                        <p:tgtEl>
-                                          <p:spTgt spid="10">
-                                            <p:txEl>
-                                              <p:pRg st="13" end="13"/>
-                                            </p:txEl>
-                                          </p:spTgt>
-                                        </p:tgtEl>
-                                        <p:attrNameLst>
-                                          <p:attrName>style.visibility</p:attrName>
-                                        </p:attrNameLst>
-                                      </p:cBhvr>
-                                      <p:to>
-                                        <p:strVal val="visible"/>
-                                      </p:to>
-                                    </p:set>
-                                  </p:childTnLst>
-                                </p:cTn>
-                              </p:par>
-                              <p:par>
-                                <p:cTn id="31" presetID="1" presetClass="entr" presetSubtype="0" fill="hold" grpId="0" nodeType="withEffect">
-                                  <p:stCondLst>
-                                    <p:cond delay="0"/>
-                                  </p:stCondLst>
-                                  <p:childTnLst>
-                                    <p:set>
-                                      <p:cBhvr>
-                                        <p:cTn id="32" dur="1" fill="hold">
-                                          <p:stCondLst>
-                                            <p:cond delay="0"/>
-                                          </p:stCondLst>
-                                        </p:cTn>
-                                        <p:tgtEl>
-                                          <p:spTgt spid="10">
-                                            <p:txEl>
-                                              <p:pRg st="14" end="14"/>
-                                            </p:txEl>
-                                          </p:spTgt>
-                                        </p:tgtEl>
-                                        <p:attrNameLst>
-                                          <p:attrName>style.visibility</p:attrName>
-                                        </p:attrNameLst>
-                                      </p:cBhvr>
-                                      <p:to>
-                                        <p:strVal val="visible"/>
-                                      </p:to>
-                                    </p:set>
-                                  </p:childTnLst>
-                                </p:cTn>
-                              </p:par>
-                            </p:childTnLst>
-                          </p:cTn>
-                        </p:par>
-                      </p:childTnLst>
-                    </p:cTn>
-                  </p:par>
                 </p:childTnLst>
               </p:cTn>
               <p:prevCondLst>
@@ -6812,6 +7010,106 @@
       </p:grpSpPr>
       <p:sp>
         <p:nvSpPr>
+          <p:cNvPr id="2" name="Title 1">
+            <a:extLst>
+              <a:ext uri="{FF2B5EF4-FFF2-40B4-BE49-F238E27FC236}">
+                <a16:creationId xmlns:a16="http://schemas.microsoft.com/office/drawing/2014/main" id="{3FC15644-E6D0-ED04-C2BE-A2DE878524BB}"/>
+              </a:ext>
+            </a:extLst>
+          </p:cNvPr>
+          <p:cNvSpPr>
+            <a:spLocks noGrp="1"/>
+          </p:cNvSpPr>
+          <p:nvPr>
+            <p:ph type="title"/>
+          </p:nvPr>
+        </p:nvSpPr>
+        <p:spPr/>
+        <p:txBody>
+          <a:bodyPr/>
+          <a:lstStyle/>
+          <a:p>
+            <a:r>
+              <a:rPr lang="en-CH" b="1" dirty="0"/>
+              <a:t>How to play?</a:t>
+            </a:r>
+            <a:endParaRPr lang="fr-FR" b="1" dirty="0"/>
+          </a:p>
+        </p:txBody>
+      </p:sp>
+      <p:sp>
+        <p:nvSpPr>
+          <p:cNvPr id="3" name="Content Placeholder 2">
+            <a:extLst>
+              <a:ext uri="{FF2B5EF4-FFF2-40B4-BE49-F238E27FC236}">
+                <a16:creationId xmlns:a16="http://schemas.microsoft.com/office/drawing/2014/main" id="{B93A1AB0-4F4E-7183-34D6-91B3FEB44D16}"/>
+              </a:ext>
+            </a:extLst>
+          </p:cNvPr>
+          <p:cNvSpPr>
+            <a:spLocks noGrp="1"/>
+          </p:cNvSpPr>
+          <p:nvPr>
+            <p:ph idx="1"/>
+          </p:nvPr>
+        </p:nvSpPr>
+        <p:spPr/>
+        <p:txBody>
+          <a:bodyPr/>
+          <a:lstStyle/>
+          <a:p>
+            <a:r>
+              <a:rPr lang="fr-FR" dirty="0"/>
+              <a:t>W</a:t>
+            </a:r>
+            <a:r>
+              <a:rPr lang="en-CH" dirty="0"/>
+              <a:t>hen you press on the game, it starts instantly. Your goal is to avoid </a:t>
+            </a:r>
+            <a:r>
+              <a:rPr lang="en-CH"/>
+              <a:t>all obstacles </a:t>
+            </a:r>
+            <a:r>
+              <a:rPr lang="en-CH" dirty="0"/>
+              <a:t>by jumping using KEY_UP or the touchscreen. If you collide with an obstacle, you lose and you can restart the game by pressing KEY_START.</a:t>
+            </a:r>
+            <a:endParaRPr lang="fr-FR" dirty="0"/>
+          </a:p>
+        </p:txBody>
+      </p:sp>
+    </p:spTree>
+    <p:extLst>
+      <p:ext uri="{BB962C8B-B14F-4D97-AF65-F5344CB8AC3E}">
+        <p14:creationId xmlns:p14="http://schemas.microsoft.com/office/powerpoint/2010/main" val="1412340150"/>
+      </p:ext>
+    </p:extLst>
+  </p:cSld>
+  <p:clrMapOvr>
+    <a:masterClrMapping/>
+  </p:clrMapOvr>
+</p:sld>
+</file>
+
+<file path=ppt/slides/slide5.xml><?xml version="1.0" encoding="utf-8"?>
+<p:sld xmlns:a="http://schemas.openxmlformats.org/drawingml/2006/main" xmlns:r="http://schemas.openxmlformats.org/officeDocument/2006/relationships" xmlns:p="http://schemas.openxmlformats.org/presentationml/2006/main">
+  <p:cSld>
+    <p:spTree>
+      <p:nvGrpSpPr>
+        <p:cNvPr id="1" name=""/>
+        <p:cNvGrpSpPr/>
+        <p:nvPr/>
+      </p:nvGrpSpPr>
+      <p:grpSpPr>
+        <a:xfrm>
+          <a:off x="0" y="0"/>
+          <a:ext cx="0" cy="0"/>
+          <a:chOff x="0" y="0"/>
+          <a:chExt cx="0" cy="0"/>
+        </a:xfrm>
+      </p:grpSpPr>
+      <p:sp>
+        <p:nvSpPr>
           <p:cNvPr id="9" name="Title 8"/>
           <p:cNvSpPr>
             <a:spLocks noGrp="1"/>
@@ -6858,10 +7156,9 @@
             <a:endParaRPr lang="en-US" sz="1600" dirty="0"/>
           </a:p>
           <a:p>
-            <a:r>
-              <a:rPr lang="en-US" sz="2000" b="1" dirty="0"/>
-              <a:t>Include an image with the final view/s of your project on the actual NDS device</a:t>
-            </a:r>
+            <a:pPr marL="0" indent="0">
+              <a:buNone/>
+            </a:pPr>
             <a:endParaRPr lang="en-US" sz="1800" dirty="0"/>
           </a:p>
           <a:p>
@@ -6872,6 +7169,66 @@
           </a:p>
         </p:txBody>
       </p:sp>
+      <p:pic>
+        <p:nvPicPr>
+          <p:cNvPr id="3" name="Picture 2" descr="A picture containing text, device, meter&#10;&#10;Description automatically generated">
+            <a:extLst>
+              <a:ext uri="{FF2B5EF4-FFF2-40B4-BE49-F238E27FC236}">
+                <a16:creationId xmlns:a16="http://schemas.microsoft.com/office/drawing/2014/main" id="{08D4E7EE-F634-CC88-49C7-79F0271A3F05}"/>
+              </a:ext>
+            </a:extLst>
+          </p:cNvPr>
+          <p:cNvPicPr>
+            <a:picLocks noChangeAspect="1"/>
+          </p:cNvPicPr>
+          <p:nvPr/>
+        </p:nvPicPr>
+        <p:blipFill>
+          <a:blip r:embed="rId3"/>
+          <a:stretch>
+            <a:fillRect/>
+          </a:stretch>
+        </p:blipFill>
+        <p:spPr>
+          <a:xfrm>
+            <a:off x="4572000" y="1729853"/>
+            <a:ext cx="4340689" cy="4221947"/>
+          </a:xfrm>
+          <a:prstGeom prst="rect">
+            <a:avLst/>
+          </a:prstGeom>
+        </p:spPr>
+      </p:pic>
+      <p:pic>
+        <p:nvPicPr>
+          <p:cNvPr id="5" name="Picture 4" descr="A picture containing text&#10;&#10;Description automatically generated">
+            <a:extLst>
+              <a:ext uri="{FF2B5EF4-FFF2-40B4-BE49-F238E27FC236}">
+                <a16:creationId xmlns:a16="http://schemas.microsoft.com/office/drawing/2014/main" id="{33173F2A-2803-AB17-90D2-169B1C691537}"/>
+              </a:ext>
+            </a:extLst>
+          </p:cNvPr>
+          <p:cNvPicPr>
+            <a:picLocks noChangeAspect="1"/>
+          </p:cNvPicPr>
+          <p:nvPr/>
+        </p:nvPicPr>
+        <p:blipFill>
+          <a:blip r:embed="rId4"/>
+          <a:stretch>
+            <a:fillRect/>
+          </a:stretch>
+        </p:blipFill>
+        <p:spPr>
+          <a:xfrm>
+            <a:off x="197755" y="1729853"/>
+            <a:ext cx="4054704" cy="4212679"/>
+          </a:xfrm>
+          <a:prstGeom prst="rect">
+            <a:avLst/>
+          </a:prstGeom>
+        </p:spPr>
+      </p:pic>
     </p:spTree>
   </p:cSld>
   <p:clrMapOvr>

</xml_diff>